<commit_message>
fixed typo in lecture
</commit_message>
<xml_diff>
--- a/lecture 5/Lecture 5 - Mobile Application Development.pptx
+++ b/lecture 5/Lecture 5 - Mobile Application Development.pptx
@@ -237,7 +237,7 @@
           <a:p>
             <a:fld id="{A3C2A6A4-4365-4DD8-8CB7-3A4F849F3EAA}" type="datetimeFigureOut">
               <a:rPr lang="en-GB" smtClean="0"/>
-              <a:t>25/09/2019</a:t>
+              <a:t>30/09/2019</a:t>
             </a:fld>
             <a:endParaRPr lang="en-GB"/>
           </a:p>
@@ -731,7 +731,7 @@
           <a:p>
             <a:fld id="{B5906FF8-4769-4691-A860-171D2AFB3E65}" type="datetimeFigureOut">
               <a:rPr lang="en-GB" smtClean="0"/>
-              <a:t>25/09/2019</a:t>
+              <a:t>30/09/2019</a:t>
             </a:fld>
             <a:endParaRPr lang="en-GB"/>
           </a:p>
@@ -939,7 +939,7 @@
           <a:p>
             <a:fld id="{B5906FF8-4769-4691-A860-171D2AFB3E65}" type="datetimeFigureOut">
               <a:rPr lang="en-GB" smtClean="0"/>
-              <a:t>25/09/2019</a:t>
+              <a:t>30/09/2019</a:t>
             </a:fld>
             <a:endParaRPr lang="en-GB"/>
           </a:p>
@@ -1195,7 +1195,7 @@
           <a:p>
             <a:fld id="{B5906FF8-4769-4691-A860-171D2AFB3E65}" type="datetimeFigureOut">
               <a:rPr lang="en-GB" smtClean="0"/>
-              <a:t>25/09/2019</a:t>
+              <a:t>30/09/2019</a:t>
             </a:fld>
             <a:endParaRPr lang="en-GB"/>
           </a:p>
@@ -1369,7 +1369,7 @@
           <a:p>
             <a:fld id="{B5906FF8-4769-4691-A860-171D2AFB3E65}" type="datetimeFigureOut">
               <a:rPr lang="en-GB" smtClean="0"/>
-              <a:t>25/09/2019</a:t>
+              <a:t>30/09/2019</a:t>
             </a:fld>
             <a:endParaRPr lang="en-GB"/>
           </a:p>
@@ -1712,7 +1712,7 @@
           <a:p>
             <a:fld id="{B5906FF8-4769-4691-A860-171D2AFB3E65}" type="datetimeFigureOut">
               <a:rPr lang="en-GB" smtClean="0"/>
-              <a:t>25/09/2019</a:t>
+              <a:t>30/09/2019</a:t>
             </a:fld>
             <a:endParaRPr lang="en-GB"/>
           </a:p>
@@ -1987,7 +1987,7 @@
           <a:p>
             <a:fld id="{B5906FF8-4769-4691-A860-171D2AFB3E65}" type="datetimeFigureOut">
               <a:rPr lang="en-GB" smtClean="0"/>
-              <a:t>25/09/2019</a:t>
+              <a:t>30/09/2019</a:t>
             </a:fld>
             <a:endParaRPr lang="en-GB"/>
           </a:p>
@@ -2366,7 +2366,7 @@
           <a:p>
             <a:fld id="{B5906FF8-4769-4691-A860-171D2AFB3E65}" type="datetimeFigureOut">
               <a:rPr lang="en-GB" smtClean="0"/>
-              <a:t>25/09/2019</a:t>
+              <a:t>30/09/2019</a:t>
             </a:fld>
             <a:endParaRPr lang="en-GB"/>
           </a:p>
@@ -2484,7 +2484,7 @@
           <a:p>
             <a:fld id="{B5906FF8-4769-4691-A860-171D2AFB3E65}" type="datetimeFigureOut">
               <a:rPr lang="en-GB" smtClean="0"/>
-              <a:t>25/09/2019</a:t>
+              <a:t>30/09/2019</a:t>
             </a:fld>
             <a:endParaRPr lang="en-GB"/>
           </a:p>
@@ -2655,7 +2655,7 @@
           <a:p>
             <a:fld id="{B5906FF8-4769-4691-A860-171D2AFB3E65}" type="datetimeFigureOut">
               <a:rPr lang="en-GB" smtClean="0"/>
-              <a:t>25/09/2019</a:t>
+              <a:t>30/09/2019</a:t>
             </a:fld>
             <a:endParaRPr lang="en-GB"/>
           </a:p>
@@ -3009,7 +3009,7 @@
           <a:p>
             <a:fld id="{B5906FF8-4769-4691-A860-171D2AFB3E65}" type="datetimeFigureOut">
               <a:rPr lang="en-GB" smtClean="0"/>
-              <a:t>25/09/2019</a:t>
+              <a:t>30/09/2019</a:t>
             </a:fld>
             <a:endParaRPr lang="en-GB"/>
           </a:p>
@@ -3391,7 +3391,7 @@
           <a:p>
             <a:fld id="{B5906FF8-4769-4691-A860-171D2AFB3E65}" type="datetimeFigureOut">
               <a:rPr lang="en-GB" smtClean="0"/>
-              <a:t>25/09/2019</a:t>
+              <a:t>30/09/2019</a:t>
             </a:fld>
             <a:endParaRPr lang="en-GB"/>
           </a:p>
@@ -3678,7 +3678,7 @@
           <a:p>
             <a:fld id="{B5906FF8-4769-4691-A860-171D2AFB3E65}" type="datetimeFigureOut">
               <a:rPr lang="en-GB" smtClean="0"/>
-              <a:t>25/09/2019</a:t>
+              <a:t>30/09/2019</a:t>
             </a:fld>
             <a:endParaRPr lang="en-GB"/>
           </a:p>
@@ -4561,15 +4561,7 @@
             </a:pPr>
             <a:r>
               <a:rPr lang="en-GB" dirty="0" smtClean="0"/>
-              <a:t> </a:t>
-            </a:r>
-            <a:r>
-              <a:rPr lang="en-GB" dirty="0" smtClean="0"/>
-              <a:t>*</a:t>
-            </a:r>
-            <a:r>
-              <a:rPr lang="en-GB" dirty="0" smtClean="0"/>
-              <a:t>ngFor </a:t>
+              <a:t> *ngFor </a:t>
             </a:r>
             <a:r>
               <a:rPr lang="en-GB" dirty="0"/>
@@ -4852,15 +4844,7 @@
             </a:pPr>
             <a:r>
               <a:rPr lang="en-GB" dirty="0" smtClean="0"/>
-              <a:t> </a:t>
-            </a:r>
-            <a:r>
-              <a:rPr lang="en-GB" dirty="0" smtClean="0"/>
-              <a:t>*</a:t>
-            </a:r>
-            <a:r>
-              <a:rPr lang="en-GB" dirty="0" smtClean="0"/>
-              <a:t>ngIf removed or adds an element to View depending on the condition.</a:t>
+              <a:t> *ngIf removed or adds an element to View depending on the condition.</a:t>
             </a:r>
             <a:endParaRPr lang="en-US" b="1" dirty="0"/>
           </a:p>
@@ -4888,7 +4872,7 @@
           <a:graphicData uri="http://schemas.openxmlformats.org/presentationml/2006/ole">
             <mc:AlternateContent xmlns:mc="http://schemas.openxmlformats.org/markup-compatibility/2006">
               <mc:Choice xmlns:v="urn:schemas-microsoft-com:vml" Requires="v">
-                <p:oleObj spid="_x0000_s1030" name="Document" r:id="rId3" imgW="8282741" imgH="2590560" progId="Word.Document.12">
+                <p:oleObj spid="_x0000_s1042" name="Document" r:id="rId3" imgW="8282741" imgH="2590560" progId="Word.Document.12">
                   <p:embed/>
                 </p:oleObj>
               </mc:Choice>
@@ -4945,7 +4929,7 @@
           <a:graphicData uri="http://schemas.openxmlformats.org/presentationml/2006/ole">
             <mc:AlternateContent xmlns:mc="http://schemas.openxmlformats.org/markup-compatibility/2006">
               <mc:Choice xmlns:v="urn:schemas-microsoft-com:vml" Requires="v">
-                <p:oleObj spid="_x0000_s1031" name="Document" r:id="rId5" imgW="5716556" imgH="3429000" progId="Word.Document.12">
+                <p:oleObj spid="_x0000_s1043" name="Document" r:id="rId5" imgW="5716556" imgH="3429000" progId="Word.Document.12">
                   <p:embed/>
                 </p:oleObj>
               </mc:Choice>
@@ -5071,15 +5055,7 @@
             </a:pPr>
             <a:r>
               <a:rPr lang="en-GB" dirty="0" smtClean="0"/>
-              <a:t> </a:t>
-            </a:r>
-            <a:r>
-              <a:rPr lang="en-GB" dirty="0" smtClean="0"/>
-              <a:t>*</a:t>
-            </a:r>
-            <a:r>
-              <a:rPr lang="en-GB" dirty="0" smtClean="0"/>
-              <a:t>ngIf result. No Avatar for Ahmed and Zia as they are ‘absent’.</a:t>
+              <a:t> *ngIf result. No Avatar for Ahmed and Zia as they are ‘absent’.</a:t>
             </a:r>
           </a:p>
           <a:p>
@@ -5836,16 +5812,16 @@
               <a:t> </a:t>
             </a:r>
             <a:r>
+              <a:rPr lang="en-GB" dirty="0" smtClean="0"/>
+              <a:t>This </a:t>
+            </a:r>
+            <a:r>
               <a:rPr lang="en-GB" dirty="0"/>
-              <a:t>This event initializes after Angular first displays the data-bound properties or </a:t>
-            </a:r>
-            <a:r>
-              <a:rPr lang="en-GB" dirty="0" smtClean="0"/>
-              <a:t>when </a:t>
-            </a:r>
-            <a:r>
-              <a:rPr lang="en-GB" dirty="0"/>
-              <a:t>the component has been initialized. This method is very useful for unsubscribing from the observables and detaching the event handlers to avoid memory leaks. </a:t>
+              <a:t>method is very useful for unsubscribing from the observables and detaching the event handlers to avoid memory leaks. </a:t>
+            </a:r>
+            <a:r>
+              <a:rPr lang="en-GB" smtClean="0"/>
+              <a:t>This is executed when ever the component is detroyed/removed from view. </a:t>
             </a:r>
             <a:endParaRPr lang="en-GB" dirty="0" smtClean="0"/>
           </a:p>

</xml_diff>